<commit_message>
update presentation. Add link on github
</commit_message>
<xml_diff>
--- a/Многопоточность.pptx
+++ b/Многопоточность.pptx
@@ -5583,12 +5583,29 @@
             <p:ph idx="1"/>
           </p:nvPr>
         </p:nvSpPr>
-        <p:spPr/>
+        <p:spPr>
+          <a:xfrm>
+            <a:off x="1627464" y="3137913"/>
+            <a:ext cx="9986394" cy="590404"/>
+          </a:xfrm>
+        </p:spPr>
         <p:txBody>
           <a:bodyPr/>
           <a:lstStyle/>
           <a:p>
-            <a:endParaRPr lang="ru-RU" dirty="0"/>
+            <a:r>
+              <a:rPr lang="en-US" dirty="0">
+                <a:solidFill>
+                  <a:schemeClr val="bg1"/>
+                </a:solidFill>
+              </a:rPr>
+              <a:t>https://github.com/Selidinok/android_multithread</a:t>
+            </a:r>
+            <a:endParaRPr lang="ru-RU" dirty="0">
+              <a:solidFill>
+                <a:schemeClr val="bg1"/>
+              </a:solidFill>
+            </a:endParaRPr>
           </a:p>
         </p:txBody>
       </p:sp>

</xml_diff>

<commit_message>
update presentation. add example handler usage
</commit_message>
<xml_diff>
--- a/Многопоточность.pptx
+++ b/Многопоточность.pptx
@@ -5,7 +5,7 @@
     <p:sldMasterId id="2147483684" r:id="rId1"/>
   </p:sldMasterIdLst>
   <p:notesMasterIdLst>
-    <p:notesMasterId r:id="rId19"/>
+    <p:notesMasterId r:id="rId20"/>
   </p:notesMasterIdLst>
   <p:sldIdLst>
     <p:sldId id="256" r:id="rId2"/>
@@ -23,8 +23,9 @@
     <p:sldId id="300" r:id="rId14"/>
     <p:sldId id="301" r:id="rId15"/>
     <p:sldId id="303" r:id="rId16"/>
-    <p:sldId id="302" r:id="rId17"/>
-    <p:sldId id="304" r:id="rId18"/>
+    <p:sldId id="305" r:id="rId17"/>
+    <p:sldId id="302" r:id="rId18"/>
+    <p:sldId id="304" r:id="rId19"/>
   </p:sldIdLst>
   <p:sldSz cx="12192000" cy="6858000"/>
   <p:notesSz cx="6858000" cy="9144000"/>
@@ -5411,6 +5412,553 @@
           <p:cNvPr id="2" name="Заголовок 1">
             <a:extLst>
               <a:ext uri="{FF2B5EF4-FFF2-40B4-BE49-F238E27FC236}">
+                <a16:creationId xmlns:a16="http://schemas.microsoft.com/office/drawing/2014/main" id="{A61C90DC-9054-4E61-9E8E-6E82F65B9741}"/>
+              </a:ext>
+            </a:extLst>
+          </p:cNvPr>
+          <p:cNvSpPr>
+            <a:spLocks noGrp="1"/>
+          </p:cNvSpPr>
+          <p:nvPr>
+            <p:ph type="title"/>
+          </p:nvPr>
+        </p:nvSpPr>
+        <p:spPr/>
+        <p:txBody>
+          <a:bodyPr/>
+          <a:lstStyle/>
+          <a:p>
+            <a:pPr algn="ctr"/>
+            <a:r>
+              <a:rPr lang="ru-RU" dirty="0">
+                <a:solidFill>
+                  <a:schemeClr val="bg1"/>
+                </a:solidFill>
+              </a:rPr>
+              <a:t>Использование</a:t>
+            </a:r>
+            <a:r>
+              <a:rPr lang="en-US" dirty="0">
+                <a:solidFill>
+                  <a:schemeClr val="bg1"/>
+                </a:solidFill>
+              </a:rPr>
+              <a:t> Handler</a:t>
+            </a:r>
+            <a:endParaRPr lang="ru-RU" dirty="0">
+              <a:solidFill>
+                <a:schemeClr val="bg1"/>
+              </a:solidFill>
+            </a:endParaRPr>
+          </a:p>
+        </p:txBody>
+      </p:sp>
+      <p:sp>
+        <p:nvSpPr>
+          <p:cNvPr id="4" name="Номер слайда 3">
+            <a:extLst>
+              <a:ext uri="{FF2B5EF4-FFF2-40B4-BE49-F238E27FC236}">
+                <a16:creationId xmlns:a16="http://schemas.microsoft.com/office/drawing/2014/main" id="{E5E37BC2-28A7-4787-BD81-961B7A3E0047}"/>
+              </a:ext>
+            </a:extLst>
+          </p:cNvPr>
+          <p:cNvSpPr>
+            <a:spLocks noGrp="1"/>
+          </p:cNvSpPr>
+          <p:nvPr>
+            <p:ph type="sldNum" sz="quarter" idx="12"/>
+          </p:nvPr>
+        </p:nvSpPr>
+        <p:spPr/>
+        <p:txBody>
+          <a:bodyPr/>
+          <a:lstStyle/>
+          <a:p>
+            <a:fld id="{B9F5FBF0-3463-467F-B8AE-ABE55FDBCDBF}" type="slidenum">
+              <a:rPr lang="ru-RU" smtClean="0"/>
+              <a:t>16</a:t>
+            </a:fld>
+            <a:endParaRPr lang="ru-RU"/>
+          </a:p>
+        </p:txBody>
+      </p:sp>
+      <p:sp>
+        <p:nvSpPr>
+          <p:cNvPr id="8" name="Rectangle 2">
+            <a:extLst>
+              <a:ext uri="{FF2B5EF4-FFF2-40B4-BE49-F238E27FC236}">
+                <a16:creationId xmlns:a16="http://schemas.microsoft.com/office/drawing/2014/main" id="{E707C804-5A20-47F6-873A-AA7113127256}"/>
+              </a:ext>
+            </a:extLst>
+          </p:cNvPr>
+          <p:cNvSpPr>
+            <a:spLocks noChangeArrowheads="1"/>
+          </p:cNvSpPr>
+          <p:nvPr/>
+        </p:nvSpPr>
+        <p:spPr bwMode="auto">
+          <a:xfrm>
+            <a:off x="1308100" y="1946988"/>
+            <a:ext cx="10045700" cy="2246769"/>
+          </a:xfrm>
+          <a:prstGeom prst="rect">
+            <a:avLst/>
+          </a:prstGeom>
+          <a:solidFill>
+            <a:srgbClr val="2B2B2B"/>
+          </a:solidFill>
+          <a:ln>
+            <a:noFill/>
+          </a:ln>
+          <a:effectLst/>
+          <a:extLst>
+            <a:ext uri="{91240B29-F687-4F45-9708-019B960494DF}">
+              <a14:hiddenLine xmlns:a14="http://schemas.microsoft.com/office/drawing/2010/main" w="9525">
+                <a:solidFill>
+                  <a:schemeClr val="tx1"/>
+                </a:solidFill>
+                <a:miter lim="800000"/>
+                <a:headEnd/>
+                <a:tailEnd/>
+              </a14:hiddenLine>
+            </a:ext>
+            <a:ext uri="{AF507438-7753-43E0-B8FC-AC1667EBCBE1}">
+              <a14:hiddenEffects xmlns:a14="http://schemas.microsoft.com/office/drawing/2010/main">
+                <a:effectLst>
+                  <a:outerShdw dist="35921" dir="2700000" algn="ctr" rotWithShape="0">
+                    <a:schemeClr val="bg2"/>
+                  </a:outerShdw>
+                </a:effectLst>
+              </a14:hiddenEffects>
+            </a:ext>
+          </a:extLst>
+        </p:spPr>
+        <p:txBody>
+          <a:bodyPr vert="horz" wrap="square" lIns="91440" tIns="45720" rIns="91440" bIns="45720" numCol="1" anchor="ctr" anchorCtr="0" compatLnSpc="1">
+            <a:prstTxWarp prst="textNoShape">
+              <a:avLst/>
+            </a:prstTxWarp>
+            <a:spAutoFit/>
+          </a:bodyPr>
+          <a:lstStyle/>
+          <a:p>
+            <a:pPr marL="0" marR="0" lvl="0" indent="0" algn="l" defTabSz="914400" rtl="0" eaLnBrk="0" fontAlgn="base" latinLnBrk="0" hangingPunct="0">
+              <a:lnSpc>
+                <a:spcPct val="100000"/>
+              </a:lnSpc>
+              <a:spcBef>
+                <a:spcPct val="0"/>
+              </a:spcBef>
+              <a:spcAft>
+                <a:spcPct val="0"/>
+              </a:spcAft>
+              <a:buClrTx/>
+              <a:buSzTx/>
+              <a:buFontTx/>
+              <a:buNone/>
+              <a:tabLst/>
+            </a:pPr>
+            <a:r>
+              <a:rPr kumimoji="0" lang="en-US" altLang="ru-RU" sz="2800" b="0" i="0" u="none" strike="noStrike" cap="none" normalizeH="0" baseline="0" dirty="0">
+                <a:ln>
+                  <a:noFill/>
+                </a:ln>
+                <a:solidFill>
+                  <a:srgbClr val="A9B7C6"/>
+                </a:solidFill>
+                <a:effectLst/>
+                <a:latin typeface="Consolas" panose="020B0609020204030204" pitchFamily="49" charset="0"/>
+              </a:rPr>
+              <a:t>Handler(</a:t>
+            </a:r>
+            <a:r>
+              <a:rPr kumimoji="0" lang="en-US" altLang="ru-RU" sz="2800" b="0" i="0" u="none" strike="noStrike" cap="none" normalizeH="0" baseline="0" dirty="0" err="1">
+                <a:ln>
+                  <a:noFill/>
+                </a:ln>
+                <a:solidFill>
+                  <a:srgbClr val="A9B7C6"/>
+                </a:solidFill>
+                <a:effectLst/>
+                <a:latin typeface="Consolas" panose="020B0609020204030204" pitchFamily="49" charset="0"/>
+              </a:rPr>
+              <a:t>Looper.getMainLooper</a:t>
+            </a:r>
+            <a:r>
+              <a:rPr kumimoji="0" lang="en-US" altLang="ru-RU" sz="2800" b="0" i="0" u="none" strike="noStrike" cap="none" normalizeH="0" baseline="0" dirty="0">
+                <a:ln>
+                  <a:noFill/>
+                </a:ln>
+                <a:solidFill>
+                  <a:srgbClr val="A9B7C6"/>
+                </a:solidFill>
+                <a:effectLst/>
+                <a:latin typeface="Consolas" panose="020B0609020204030204" pitchFamily="49" charset="0"/>
+              </a:rPr>
+              <a:t>())</a:t>
+            </a:r>
+            <a:r>
+              <a:rPr kumimoji="0" lang="ru-RU" altLang="ru-RU" sz="2800" b="0" i="0" u="none" strike="noStrike" cap="none" normalizeH="0" baseline="0" dirty="0">
+                <a:ln>
+                  <a:noFill/>
+                </a:ln>
+                <a:solidFill>
+                  <a:srgbClr val="A9B7C6"/>
+                </a:solidFill>
+                <a:effectLst/>
+                <a:latin typeface="Consolas" panose="020B0609020204030204" pitchFamily="49" charset="0"/>
+              </a:rPr>
+              <a:t>.</a:t>
+            </a:r>
+            <a:r>
+              <a:rPr kumimoji="0" lang="ru-RU" altLang="ru-RU" sz="2800" b="0" i="0" u="none" strike="noStrike" cap="none" normalizeH="0" baseline="0" dirty="0" err="1">
+                <a:ln>
+                  <a:noFill/>
+                </a:ln>
+                <a:solidFill>
+                  <a:srgbClr val="A9B7C6"/>
+                </a:solidFill>
+                <a:effectLst/>
+                <a:latin typeface="Consolas" panose="020B0609020204030204" pitchFamily="49" charset="0"/>
+              </a:rPr>
+              <a:t>post</a:t>
+            </a:r>
+            <a:r>
+              <a:rPr kumimoji="0" lang="ru-RU" altLang="ru-RU" sz="2800" b="0" i="0" u="none" strike="noStrike" cap="none" normalizeH="0" baseline="0" dirty="0">
+                <a:ln>
+                  <a:noFill/>
+                </a:ln>
+                <a:solidFill>
+                  <a:srgbClr val="A9B7C6"/>
+                </a:solidFill>
+                <a:effectLst/>
+                <a:latin typeface="Consolas" panose="020B0609020204030204" pitchFamily="49" charset="0"/>
+              </a:rPr>
+              <a:t> </a:t>
+            </a:r>
+            <a:r>
+              <a:rPr kumimoji="0" lang="ru-RU" altLang="ru-RU" sz="2800" b="1" i="0" u="none" strike="noStrike" cap="none" normalizeH="0" baseline="0" dirty="0">
+                <a:ln>
+                  <a:noFill/>
+                </a:ln>
+                <a:solidFill>
+                  <a:srgbClr val="A9B7C6"/>
+                </a:solidFill>
+                <a:effectLst/>
+                <a:latin typeface="Consolas" panose="020B0609020204030204" pitchFamily="49" charset="0"/>
+              </a:rPr>
+              <a:t>{</a:t>
+            </a:r>
+            <a:r>
+              <a:rPr kumimoji="0" lang="en-US" altLang="ru-RU" sz="2800" b="1" i="0" u="none" strike="noStrike" cap="none" normalizeH="0" baseline="0" dirty="0">
+                <a:ln>
+                  <a:noFill/>
+                </a:ln>
+                <a:solidFill>
+                  <a:srgbClr val="A9B7C6"/>
+                </a:solidFill>
+                <a:effectLst/>
+                <a:latin typeface="Consolas" panose="020B0609020204030204" pitchFamily="49" charset="0"/>
+              </a:rPr>
+              <a:t> … </a:t>
+            </a:r>
+            <a:r>
+              <a:rPr kumimoji="0" lang="ru-RU" altLang="ru-RU" sz="2800" b="1" i="0" u="none" strike="noStrike" cap="none" normalizeH="0" baseline="0" dirty="0">
+                <a:ln>
+                  <a:noFill/>
+                </a:ln>
+                <a:solidFill>
+                  <a:srgbClr val="A9B7C6"/>
+                </a:solidFill>
+                <a:effectLst/>
+                <a:latin typeface="Consolas" panose="020B0609020204030204" pitchFamily="49" charset="0"/>
+              </a:rPr>
+              <a:t>}</a:t>
+            </a:r>
+            <a:endParaRPr kumimoji="0" lang="en-US" altLang="ru-RU" sz="2800" b="1" i="0" u="none" strike="noStrike" cap="none" normalizeH="0" baseline="0" dirty="0">
+              <a:ln>
+                <a:noFill/>
+              </a:ln>
+              <a:solidFill>
+                <a:srgbClr val="A9B7C6"/>
+              </a:solidFill>
+              <a:effectLst/>
+              <a:latin typeface="Consolas" panose="020B0609020204030204" pitchFamily="49" charset="0"/>
+            </a:endParaRPr>
+          </a:p>
+          <a:p>
+            <a:pPr marL="0" marR="0" lvl="0" indent="0" algn="l" defTabSz="914400" rtl="0" eaLnBrk="0" fontAlgn="base" latinLnBrk="0" hangingPunct="0">
+              <a:lnSpc>
+                <a:spcPct val="100000"/>
+              </a:lnSpc>
+              <a:spcBef>
+                <a:spcPct val="0"/>
+              </a:spcBef>
+              <a:spcAft>
+                <a:spcPct val="0"/>
+              </a:spcAft>
+              <a:buClrTx/>
+              <a:buSzTx/>
+              <a:buFontTx/>
+              <a:buNone/>
+              <a:tabLst/>
+            </a:pPr>
+            <a:br>
+              <a:rPr kumimoji="0" lang="ru-RU" altLang="ru-RU" sz="2800" b="1" i="0" u="none" strike="noStrike" cap="none" normalizeH="0" baseline="0" dirty="0">
+                <a:ln>
+                  <a:noFill/>
+                </a:ln>
+                <a:solidFill>
+                  <a:srgbClr val="A9B7C6"/>
+                </a:solidFill>
+                <a:effectLst/>
+                <a:latin typeface="Consolas" panose="020B0609020204030204" pitchFamily="49" charset="0"/>
+              </a:rPr>
+            </a:br>
+            <a:r>
+              <a:rPr kumimoji="0" lang="ru-RU" altLang="ru-RU" sz="2800" b="0" i="1" u="none" strike="noStrike" cap="none" normalizeH="0" baseline="0" dirty="0" err="1">
+                <a:ln>
+                  <a:noFill/>
+                </a:ln>
+                <a:solidFill>
+                  <a:srgbClr val="9876AA"/>
+                </a:solidFill>
+                <a:effectLst/>
+                <a:latin typeface="Consolas" panose="020B0609020204030204" pitchFamily="49" charset="0"/>
+              </a:rPr>
+              <a:t>activity</a:t>
+            </a:r>
+            <a:r>
+              <a:rPr kumimoji="0" lang="ru-RU" altLang="ru-RU" sz="2800" b="0" i="0" u="none" strike="noStrike" cap="none" normalizeH="0" baseline="0" dirty="0">
+                <a:ln>
+                  <a:noFill/>
+                </a:ln>
+                <a:solidFill>
+                  <a:srgbClr val="A9B7C6"/>
+                </a:solidFill>
+                <a:effectLst/>
+                <a:latin typeface="Consolas" panose="020B0609020204030204" pitchFamily="49" charset="0"/>
+              </a:rPr>
+              <a:t>?.</a:t>
+            </a:r>
+            <a:r>
+              <a:rPr kumimoji="0" lang="ru-RU" altLang="ru-RU" sz="2800" b="0" i="0" u="none" strike="noStrike" cap="none" normalizeH="0" baseline="0" dirty="0" err="1">
+                <a:ln>
+                  <a:noFill/>
+                </a:ln>
+                <a:solidFill>
+                  <a:srgbClr val="A9B7C6"/>
+                </a:solidFill>
+                <a:effectLst/>
+                <a:latin typeface="Consolas" panose="020B0609020204030204" pitchFamily="49" charset="0"/>
+              </a:rPr>
+              <a:t>runOnUiThread</a:t>
+            </a:r>
+            <a:r>
+              <a:rPr kumimoji="0" lang="ru-RU" altLang="ru-RU" sz="2800" b="0" i="0" u="none" strike="noStrike" cap="none" normalizeH="0" baseline="0" dirty="0">
+                <a:ln>
+                  <a:noFill/>
+                </a:ln>
+                <a:solidFill>
+                  <a:srgbClr val="A9B7C6"/>
+                </a:solidFill>
+                <a:effectLst/>
+                <a:latin typeface="Consolas" panose="020B0609020204030204" pitchFamily="49" charset="0"/>
+              </a:rPr>
+              <a:t> </a:t>
+            </a:r>
+            <a:r>
+              <a:rPr kumimoji="0" lang="ru-RU" altLang="ru-RU" sz="2800" b="1" i="0" u="none" strike="noStrike" cap="none" normalizeH="0" baseline="0" dirty="0">
+                <a:ln>
+                  <a:noFill/>
+                </a:ln>
+                <a:solidFill>
+                  <a:srgbClr val="A9B7C6"/>
+                </a:solidFill>
+                <a:effectLst/>
+                <a:latin typeface="Consolas" panose="020B0609020204030204" pitchFamily="49" charset="0"/>
+              </a:rPr>
+              <a:t>{ </a:t>
+            </a:r>
+            <a:r>
+              <a:rPr kumimoji="0" lang="en-US" altLang="ru-RU" sz="2800" b="1" i="0" u="none" strike="noStrike" cap="none" normalizeH="0" baseline="0" dirty="0">
+                <a:ln>
+                  <a:noFill/>
+                </a:ln>
+                <a:solidFill>
+                  <a:srgbClr val="A9B7C6"/>
+                </a:solidFill>
+                <a:effectLst/>
+                <a:latin typeface="Consolas" panose="020B0609020204030204" pitchFamily="49" charset="0"/>
+              </a:rPr>
+              <a:t>…</a:t>
+            </a:r>
+            <a:r>
+              <a:rPr kumimoji="0" lang="ru-RU" altLang="ru-RU" sz="2800" b="1" i="0" u="none" strike="noStrike" cap="none" normalizeH="0" baseline="0" dirty="0">
+                <a:ln>
+                  <a:noFill/>
+                </a:ln>
+                <a:solidFill>
+                  <a:srgbClr val="A9B7C6"/>
+                </a:solidFill>
+                <a:effectLst/>
+                <a:latin typeface="Consolas" panose="020B0609020204030204" pitchFamily="49" charset="0"/>
+              </a:rPr>
+              <a:t> }</a:t>
+            </a:r>
+            <a:endParaRPr kumimoji="0" lang="en-US" altLang="ru-RU" sz="2800" b="1" i="0" u="none" strike="noStrike" cap="none" normalizeH="0" baseline="0" dirty="0">
+              <a:ln>
+                <a:noFill/>
+              </a:ln>
+              <a:solidFill>
+                <a:srgbClr val="A9B7C6"/>
+              </a:solidFill>
+              <a:effectLst/>
+              <a:latin typeface="Consolas" panose="020B0609020204030204" pitchFamily="49" charset="0"/>
+            </a:endParaRPr>
+          </a:p>
+          <a:p>
+            <a:pPr marL="0" marR="0" lvl="0" indent="0" algn="l" defTabSz="914400" rtl="0" eaLnBrk="0" fontAlgn="base" latinLnBrk="0" hangingPunct="0">
+              <a:lnSpc>
+                <a:spcPct val="100000"/>
+              </a:lnSpc>
+              <a:spcBef>
+                <a:spcPct val="0"/>
+              </a:spcBef>
+              <a:spcAft>
+                <a:spcPct val="0"/>
+              </a:spcAft>
+              <a:buClrTx/>
+              <a:buSzTx/>
+              <a:buFontTx/>
+              <a:buNone/>
+              <a:tabLst/>
+            </a:pPr>
+            <a:br>
+              <a:rPr kumimoji="0" lang="ru-RU" altLang="ru-RU" sz="2800" b="1" i="0" u="none" strike="noStrike" cap="none" normalizeH="0" baseline="0" dirty="0">
+                <a:ln>
+                  <a:noFill/>
+                </a:ln>
+                <a:solidFill>
+                  <a:srgbClr val="A9B7C6"/>
+                </a:solidFill>
+                <a:effectLst/>
+                <a:latin typeface="Consolas" panose="020B0609020204030204" pitchFamily="49" charset="0"/>
+              </a:rPr>
+            </a:br>
+            <a:r>
+              <a:rPr kumimoji="0" lang="ru-RU" altLang="ru-RU" sz="2800" b="0" i="0" u="none" strike="noStrike" cap="none" normalizeH="0" baseline="0" dirty="0" err="1">
+                <a:ln>
+                  <a:noFill/>
+                </a:ln>
+                <a:solidFill>
+                  <a:srgbClr val="A9B7C6"/>
+                </a:solidFill>
+                <a:effectLst/>
+                <a:latin typeface="Consolas" panose="020B0609020204030204" pitchFamily="49" charset="0"/>
+              </a:rPr>
+              <a:t>view.post</a:t>
+            </a:r>
+            <a:r>
+              <a:rPr kumimoji="0" lang="ru-RU" altLang="ru-RU" sz="2800" b="0" i="0" u="none" strike="noStrike" cap="none" normalizeH="0" baseline="0" dirty="0">
+                <a:ln>
+                  <a:noFill/>
+                </a:ln>
+                <a:solidFill>
+                  <a:srgbClr val="A9B7C6"/>
+                </a:solidFill>
+                <a:effectLst/>
+                <a:latin typeface="Consolas" panose="020B0609020204030204" pitchFamily="49" charset="0"/>
+              </a:rPr>
+              <a:t> </a:t>
+            </a:r>
+            <a:r>
+              <a:rPr kumimoji="0" lang="ru-RU" altLang="ru-RU" sz="2800" b="1" i="0" u="none" strike="noStrike" cap="none" normalizeH="0" baseline="0" dirty="0">
+                <a:ln>
+                  <a:noFill/>
+                </a:ln>
+                <a:solidFill>
+                  <a:srgbClr val="A9B7C6"/>
+                </a:solidFill>
+                <a:effectLst/>
+                <a:latin typeface="Consolas" panose="020B0609020204030204" pitchFamily="49" charset="0"/>
+              </a:rPr>
+              <a:t>{ </a:t>
+            </a:r>
+            <a:r>
+              <a:rPr kumimoji="0" lang="en-US" altLang="ru-RU" sz="2800" b="1" i="0" u="none" strike="noStrike" cap="none" normalizeH="0" baseline="0" dirty="0">
+                <a:ln>
+                  <a:noFill/>
+                </a:ln>
+                <a:solidFill>
+                  <a:srgbClr val="A9B7C6"/>
+                </a:solidFill>
+                <a:effectLst/>
+                <a:latin typeface="Consolas" panose="020B0609020204030204" pitchFamily="49" charset="0"/>
+              </a:rPr>
+              <a:t>…</a:t>
+            </a:r>
+            <a:r>
+              <a:rPr kumimoji="0" lang="ru-RU" altLang="ru-RU" sz="2800" b="1" i="0" u="none" strike="noStrike" cap="none" normalizeH="0" baseline="0" dirty="0">
+                <a:ln>
+                  <a:noFill/>
+                </a:ln>
+                <a:solidFill>
+                  <a:srgbClr val="A9B7C6"/>
+                </a:solidFill>
+                <a:effectLst/>
+                <a:latin typeface="Consolas" panose="020B0609020204030204" pitchFamily="49" charset="0"/>
+              </a:rPr>
+              <a:t> }</a:t>
+            </a:r>
+            <a:endParaRPr kumimoji="0" lang="ru-RU" altLang="ru-RU" sz="2800" b="0" i="0" u="none" strike="noStrike" cap="none" normalizeH="0" baseline="0" dirty="0">
+              <a:ln>
+                <a:noFill/>
+              </a:ln>
+              <a:solidFill>
+                <a:schemeClr val="tx1"/>
+              </a:solidFill>
+              <a:effectLst/>
+              <a:latin typeface="Arial" panose="020B0604020202020204" pitchFamily="34" charset="0"/>
+            </a:endParaRPr>
+          </a:p>
+        </p:txBody>
+      </p:sp>
+    </p:spTree>
+    <p:extLst>
+      <p:ext uri="{BB962C8B-B14F-4D97-AF65-F5344CB8AC3E}">
+        <p14:creationId xmlns:p14="http://schemas.microsoft.com/office/powerpoint/2010/main" val="910722573"/>
+      </p:ext>
+    </p:extLst>
+  </p:cSld>
+  <p:clrMapOvr>
+    <a:masterClrMapping/>
+  </p:clrMapOvr>
+</p:sld>
+</file>
+
+<file path=ppt/slides/slide17.xml><?xml version="1.0" encoding="utf-8"?>
+<p:sld xmlns:a="http://schemas.openxmlformats.org/drawingml/2006/main" xmlns:r="http://schemas.openxmlformats.org/officeDocument/2006/relationships" xmlns:p="http://schemas.openxmlformats.org/presentationml/2006/main">
+  <p:cSld>
+    <p:spTree>
+      <p:nvGrpSpPr>
+        <p:cNvPr id="1" name=""/>
+        <p:cNvGrpSpPr/>
+        <p:nvPr/>
+      </p:nvGrpSpPr>
+      <p:grpSpPr>
+        <a:xfrm>
+          <a:off x="0" y="0"/>
+          <a:ext cx="0" cy="0"/>
+          <a:chOff x="0" y="0"/>
+          <a:chExt cx="0" cy="0"/>
+        </a:xfrm>
+      </p:grpSpPr>
+      <p:sp>
+        <p:nvSpPr>
+          <p:cNvPr id="2" name="Заголовок 1">
+            <a:extLst>
+              <a:ext uri="{FF2B5EF4-FFF2-40B4-BE49-F238E27FC236}">
                 <a16:creationId xmlns:a16="http://schemas.microsoft.com/office/drawing/2014/main" id="{360EC9FE-A2FE-498D-ABDA-A1103B217430}"/>
               </a:ext>
             </a:extLst>
@@ -5498,7 +6046,7 @@
           <a:p>
             <a:fld id="{B9F5FBF0-3463-467F-B8AE-ABE55FDBCDBF}" type="slidenum">
               <a:rPr lang="ru-RU" smtClean="0"/>
-              <a:t>16</a:t>
+              <a:t>17</a:t>
             </a:fld>
             <a:endParaRPr lang="ru-RU"/>
           </a:p>
@@ -5517,7 +6065,7 @@
 </p:sld>
 </file>
 
-<file path=ppt/slides/slide17.xml><?xml version="1.0" encoding="utf-8"?>
+<file path=ppt/slides/slide18.xml><?xml version="1.0" encoding="utf-8"?>
 <p:sld xmlns:a="http://schemas.openxmlformats.org/drawingml/2006/main" xmlns:r="http://schemas.openxmlformats.org/officeDocument/2006/relationships" xmlns:p="http://schemas.openxmlformats.org/presentationml/2006/main">
   <p:cSld>
     <p:spTree>
@@ -5632,7 +6180,7 @@
           <a:p>
             <a:fld id="{B9F5FBF0-3463-467F-B8AE-ABE55FDBCDBF}" type="slidenum">
               <a:rPr lang="ru-RU" smtClean="0"/>
-              <a:t>17</a:t>
+              <a:t>18</a:t>
             </a:fld>
             <a:endParaRPr lang="ru-RU"/>
           </a:p>

</xml_diff>